<commit_message>
upload modified final ppt v2
</commit_message>
<xml_diff>
--- a/Docs/20190625_졸업논문 최종발표/0625 논문 최종발표_v2.pptx
+++ b/Docs/20190625_졸업논문 최종발표/0625 논문 최종발표_v2.pptx
@@ -16,8 +16,8 @@
     <p:sldId id="384" r:id="rId7"/>
     <p:sldId id="385" r:id="rId8"/>
     <p:sldId id="386" r:id="rId9"/>
-    <p:sldId id="388" r:id="rId10"/>
-    <p:sldId id="396" r:id="rId11"/>
+    <p:sldId id="396" r:id="rId10"/>
+    <p:sldId id="388" r:id="rId11"/>
     <p:sldId id="405" r:id="rId12"/>
     <p:sldId id="397" r:id="rId13"/>
     <p:sldId id="398" r:id="rId14"/>
@@ -1133,14 +1133,6 @@
         </dgm:presLayoutVars>
       </dgm:prSet>
       <dgm:spPr/>
-      <dgm:t>
-        <a:bodyPr/>
-        <a:lstStyle/>
-        <a:p>
-          <a:pPr latinLnBrk="1"/>
-          <a:endParaRPr lang="ko-KR" altLang="en-US"/>
-        </a:p>
-      </dgm:t>
     </dgm:pt>
     <dgm:pt modelId="{0B154CF7-B259-450D-AA7C-DAB0A76A660E}" type="pres">
       <dgm:prSet presAssocID="{68BB556C-673B-433B-92D3-B30E3E43F63A}" presName="Name1" presStyleCnt="0"/>
@@ -1157,14 +1149,6 @@
     <dgm:pt modelId="{40373EC0-2083-4C01-A91E-86C80571EB71}" type="pres">
       <dgm:prSet presAssocID="{68BB556C-673B-433B-92D3-B30E3E43F63A}" presName="conn" presStyleLbl="parChTrans1D2" presStyleIdx="0" presStyleCnt="1"/>
       <dgm:spPr/>
-      <dgm:t>
-        <a:bodyPr/>
-        <a:lstStyle/>
-        <a:p>
-          <a:pPr latinLnBrk="1"/>
-          <a:endParaRPr lang="ko-KR" altLang="en-US"/>
-        </a:p>
-      </dgm:t>
     </dgm:pt>
     <dgm:pt modelId="{8B27F366-0D51-4930-8938-9E981D2984D7}" type="pres">
       <dgm:prSet presAssocID="{68BB556C-673B-433B-92D3-B30E3E43F63A}" presName="extraNode" presStyleLbl="node1" presStyleIdx="0" presStyleCnt="3"/>
@@ -1181,14 +1165,6 @@
         </dgm:presLayoutVars>
       </dgm:prSet>
       <dgm:spPr/>
-      <dgm:t>
-        <a:bodyPr/>
-        <a:lstStyle/>
-        <a:p>
-          <a:pPr latinLnBrk="1"/>
-          <a:endParaRPr lang="ko-KR" altLang="en-US"/>
-        </a:p>
-      </dgm:t>
     </dgm:pt>
     <dgm:pt modelId="{FCBB6759-BE93-4868-980D-9B876E8FD513}" type="pres">
       <dgm:prSet presAssocID="{BCE60EB9-9EF7-4A3D-B55B-F48BEBBF3D5E}" presName="accent_1" presStyleCnt="0"/>
@@ -1205,14 +1181,6 @@
         </dgm:presLayoutVars>
       </dgm:prSet>
       <dgm:spPr/>
-      <dgm:t>
-        <a:bodyPr/>
-        <a:lstStyle/>
-        <a:p>
-          <a:pPr latinLnBrk="1"/>
-          <a:endParaRPr lang="ko-KR" altLang="en-US"/>
-        </a:p>
-      </dgm:t>
     </dgm:pt>
     <dgm:pt modelId="{53EAD787-B125-40B9-8D7A-E351C67DD9BB}" type="pres">
       <dgm:prSet presAssocID="{EBAB9701-3918-4D08-8C6D-15182FE3F33E}" presName="accent_2" presStyleCnt="0"/>
@@ -1229,14 +1197,6 @@
         </dgm:presLayoutVars>
       </dgm:prSet>
       <dgm:spPr/>
-      <dgm:t>
-        <a:bodyPr/>
-        <a:lstStyle/>
-        <a:p>
-          <a:pPr latinLnBrk="1"/>
-          <a:endParaRPr lang="ko-KR" altLang="en-US"/>
-        </a:p>
-      </dgm:t>
     </dgm:pt>
     <dgm:pt modelId="{F096F63D-7597-40E6-BEDE-D2D358605814}" type="pres">
       <dgm:prSet presAssocID="{CC9679E7-8AC0-49BD-B3DD-32D2F894D6D4}" presName="accent_3" presStyleCnt="0"/>
@@ -1248,14 +1208,14 @@
     </dgm:pt>
   </dgm:ptLst>
   <dgm:cxnLst>
+    <dgm:cxn modelId="{7583B30E-5D9B-4A9B-B441-1CC3C1EF03B8}" type="presOf" srcId="{8B636A2A-BE0C-4145-BEA1-AE92064C6A0A}" destId="{40373EC0-2083-4C01-A91E-86C80571EB71}" srcOrd="0" destOrd="0" presId="urn:microsoft.com/office/officeart/2008/layout/VerticalCurvedList"/>
+    <dgm:cxn modelId="{FC9B1715-30C2-4EB7-8166-3774D2AAC6D7}" srcId="{68BB556C-673B-433B-92D3-B30E3E43F63A}" destId="{CC9679E7-8AC0-49BD-B3DD-32D2F894D6D4}" srcOrd="2" destOrd="0" parTransId="{BBC078D1-7E7B-434C-9748-B3892224863F}" sibTransId="{B5675528-0FE5-4E96-AC20-5139BABA76F7}"/>
+    <dgm:cxn modelId="{9BDCCD30-4FE3-4779-87CC-6947C02FDC6C}" type="presOf" srcId="{68BB556C-673B-433B-92D3-B30E3E43F63A}" destId="{74B18B1A-C845-4997-8B33-1909DAA22835}" srcOrd="0" destOrd="0" presId="urn:microsoft.com/office/officeart/2008/layout/VerticalCurvedList"/>
     <dgm:cxn modelId="{7E344A34-4907-4F16-BAC1-D11671FA799A}" srcId="{68BB556C-673B-433B-92D3-B30E3E43F63A}" destId="{BCE60EB9-9EF7-4A3D-B55B-F48BEBBF3D5E}" srcOrd="0" destOrd="0" parTransId="{6A90220A-D3B2-40BE-9D57-ED489E4E3D7E}" sibTransId="{8B636A2A-BE0C-4145-BEA1-AE92064C6A0A}"/>
+    <dgm:cxn modelId="{E028DF42-5909-4266-8287-5AE482C65BFC}" type="presOf" srcId="{BCE60EB9-9EF7-4A3D-B55B-F48BEBBF3D5E}" destId="{4355E57C-85B7-4006-A67E-B12DC771B081}" srcOrd="0" destOrd="0" presId="urn:microsoft.com/office/officeart/2008/layout/VerticalCurvedList"/>
     <dgm:cxn modelId="{429BDAB5-C69A-4112-AAFF-1BB295D67D70}" type="presOf" srcId="{CC9679E7-8AC0-49BD-B3DD-32D2F894D6D4}" destId="{9E80A869-436A-4734-8366-2EE1E1F4E698}" srcOrd="0" destOrd="0" presId="urn:microsoft.com/office/officeart/2008/layout/VerticalCurvedList"/>
-    <dgm:cxn modelId="{9BDCCD30-4FE3-4779-87CC-6947C02FDC6C}" type="presOf" srcId="{68BB556C-673B-433B-92D3-B30E3E43F63A}" destId="{74B18B1A-C845-4997-8B33-1909DAA22835}" srcOrd="0" destOrd="0" presId="urn:microsoft.com/office/officeart/2008/layout/VerticalCurvedList"/>
-    <dgm:cxn modelId="{E028DF42-5909-4266-8287-5AE482C65BFC}" type="presOf" srcId="{BCE60EB9-9EF7-4A3D-B55B-F48BEBBF3D5E}" destId="{4355E57C-85B7-4006-A67E-B12DC771B081}" srcOrd="0" destOrd="0" presId="urn:microsoft.com/office/officeart/2008/layout/VerticalCurvedList"/>
     <dgm:cxn modelId="{B1FF96C5-1A2A-4919-AF5B-C9D1B02262D7}" type="presOf" srcId="{EBAB9701-3918-4D08-8C6D-15182FE3F33E}" destId="{BD81B8D6-B875-4AE1-9BBB-45F64AACA1F9}" srcOrd="0" destOrd="0" presId="urn:microsoft.com/office/officeart/2008/layout/VerticalCurvedList"/>
-    <dgm:cxn modelId="{7583B30E-5D9B-4A9B-B441-1CC3C1EF03B8}" type="presOf" srcId="{8B636A2A-BE0C-4145-BEA1-AE92064C6A0A}" destId="{40373EC0-2083-4C01-A91E-86C80571EB71}" srcOrd="0" destOrd="0" presId="urn:microsoft.com/office/officeart/2008/layout/VerticalCurvedList"/>
     <dgm:cxn modelId="{B29396D1-9B16-4C55-9444-D822D1926C24}" srcId="{68BB556C-673B-433B-92D3-B30E3E43F63A}" destId="{EBAB9701-3918-4D08-8C6D-15182FE3F33E}" srcOrd="1" destOrd="0" parTransId="{37B377A3-03F6-4D0C-87FB-AB0B2B62B002}" sibTransId="{31037C1E-6E98-48DB-835F-1C23C8935BBB}"/>
-    <dgm:cxn modelId="{FC9B1715-30C2-4EB7-8166-3774D2AAC6D7}" srcId="{68BB556C-673B-433B-92D3-B30E3E43F63A}" destId="{CC9679E7-8AC0-49BD-B3DD-32D2F894D6D4}" srcOrd="2" destOrd="0" parTransId="{BBC078D1-7E7B-434C-9748-B3892224863F}" sibTransId="{B5675528-0FE5-4E96-AC20-5139BABA76F7}"/>
     <dgm:cxn modelId="{DB64D6B2-0458-410B-AE8B-EDDBD75B1E78}" type="presParOf" srcId="{74B18B1A-C845-4997-8B33-1909DAA22835}" destId="{0B154CF7-B259-450D-AA7C-DAB0A76A660E}" srcOrd="0" destOrd="0" presId="urn:microsoft.com/office/officeart/2008/layout/VerticalCurvedList"/>
     <dgm:cxn modelId="{A63853DA-0EDE-4453-8449-E481EA061CBC}" type="presParOf" srcId="{0B154CF7-B259-450D-AA7C-DAB0A76A660E}" destId="{86D5B6C1-467E-4E15-A606-511EFCE51A07}" srcOrd="0" destOrd="0" presId="urn:microsoft.com/office/officeart/2008/layout/VerticalCurvedList"/>
     <dgm:cxn modelId="{3A9B9B72-9474-489C-94BB-8A18DEADD68B}" type="presParOf" srcId="{86D5B6C1-467E-4E15-A606-511EFCE51A07}" destId="{FAE31EA7-6CAC-4544-8112-265B42C80952}" srcOrd="0" destOrd="0" presId="urn:microsoft.com/office/officeart/2008/layout/VerticalCurvedList"/>
@@ -1381,7 +1341,7 @@
         </a:bodyPr>
         <a:lstStyle/>
         <a:p>
-          <a:pPr lvl="0" algn="l" defTabSz="889000" latinLnBrk="1">
+          <a:pPr marL="0" lvl="0" indent="0" algn="l" defTabSz="889000" latinLnBrk="1">
             <a:lnSpc>
               <a:spcPct val="90000"/>
             </a:lnSpc>
@@ -1391,6 +1351,7 @@
             <a:spcAft>
               <a:spcPct val="35000"/>
             </a:spcAft>
+            <a:buNone/>
           </a:pPr>
           <a:r>
             <a:rPr lang="en-US" altLang="ko-KR" sz="2000" kern="1200" dirty="0" err="1">
@@ -1521,7 +1482,7 @@
         </a:bodyPr>
         <a:lstStyle/>
         <a:p>
-          <a:pPr lvl="0" algn="l" defTabSz="889000" latinLnBrk="1">
+          <a:pPr marL="0" lvl="0" indent="0" algn="l" defTabSz="889000" latinLnBrk="1">
             <a:lnSpc>
               <a:spcPct val="90000"/>
             </a:lnSpc>
@@ -1531,6 +1492,7 @@
             <a:spcAft>
               <a:spcPct val="35000"/>
             </a:spcAft>
+            <a:buNone/>
           </a:pPr>
           <a:r>
             <a:rPr lang="en-US" altLang="ko-KR" sz="2000" kern="1200" dirty="0" err="1">
@@ -1661,7 +1623,7 @@
         </a:bodyPr>
         <a:lstStyle/>
         <a:p>
-          <a:pPr lvl="0" algn="l" defTabSz="889000" latinLnBrk="1">
+          <a:pPr marL="0" lvl="0" indent="0" algn="l" defTabSz="889000" latinLnBrk="1">
             <a:lnSpc>
               <a:spcPct val="90000"/>
             </a:lnSpc>
@@ -1671,6 +1633,7 @@
             <a:spcAft>
               <a:spcPct val="35000"/>
             </a:spcAft>
+            <a:buNone/>
           </a:pPr>
           <a:r>
             <a:rPr lang="en-US" altLang="ko-KR" sz="2000" kern="1200" dirty="0" err="1">
@@ -5860,372 +5823,23 @@
           </a:p>
         </p:txBody>
       </p:sp>
-      <p:sp>
-        <p:nvSpPr>
-          <p:cNvPr id="3" name="TextBox 2"/>
-          <p:cNvSpPr txBox="1"/>
-          <p:nvPr/>
-        </p:nvSpPr>
-        <p:spPr>
-          <a:xfrm>
-            <a:off x="387568" y="1663780"/>
-            <a:ext cx="11575832" cy="718338"/>
-          </a:xfrm>
-          <a:prstGeom prst="rect">
-            <a:avLst/>
-          </a:prstGeom>
-          <a:noFill/>
-        </p:spPr>
-        <p:txBody>
-          <a:bodyPr wrap="square" rtlCol="0">
-            <a:spAutoFit/>
-          </a:bodyPr>
-          <a:lstStyle/>
-          <a:p>
-            <a:pPr algn="ctr">
-              <a:lnSpc>
-                <a:spcPct val="200000"/>
-              </a:lnSpc>
-            </a:pPr>
-            <a:r>
-              <a:rPr lang="en-US" altLang="ko-KR" sz="2400" b="1" dirty="0">
-                <a:solidFill>
-                  <a:srgbClr val="0070C0"/>
-                </a:solidFill>
-              </a:rPr>
-              <a:t>“</a:t>
-            </a:r>
-            <a:r>
-              <a:rPr lang="en-US" altLang="ko-KR" sz="2400" b="1" u="sng" dirty="0">
-                <a:solidFill>
-                  <a:srgbClr val="0070C0"/>
-                </a:solidFill>
-              </a:rPr>
-              <a:t>URL</a:t>
-            </a:r>
-            <a:r>
-              <a:rPr lang="ko-KR" altLang="en-US" sz="2400" b="1" u="sng" dirty="0">
-                <a:solidFill>
-                  <a:srgbClr val="0070C0"/>
-                </a:solidFill>
-              </a:rPr>
-              <a:t>과 </a:t>
-            </a:r>
-            <a:r>
-              <a:rPr lang="en-US" altLang="ko-KR" sz="2400" b="1" u="sng" dirty="0">
-                <a:solidFill>
-                  <a:srgbClr val="0070C0"/>
-                </a:solidFill>
-              </a:rPr>
-              <a:t>Image Comparison</a:t>
-            </a:r>
-            <a:r>
-              <a:rPr lang="ko-KR" altLang="en-US" sz="2400" b="1" u="sng" dirty="0">
-                <a:solidFill>
-                  <a:srgbClr val="0070C0"/>
-                </a:solidFill>
-              </a:rPr>
-              <a:t>을 이용한 웹사이트 위</a:t>
-            </a:r>
-            <a:r>
-              <a:rPr lang="en-US" altLang="ko-KR" sz="2400" b="1" u="sng" dirty="0">
-                <a:solidFill>
-                  <a:srgbClr val="0070C0"/>
-                </a:solidFill>
-              </a:rPr>
-              <a:t>•</a:t>
-            </a:r>
-            <a:r>
-              <a:rPr lang="ko-KR" altLang="en-US" sz="2400" b="1" u="sng" dirty="0">
-                <a:solidFill>
-                  <a:srgbClr val="0070C0"/>
-                </a:solidFill>
-              </a:rPr>
-              <a:t>변조 탐지 및 알림 서비스</a:t>
-            </a:r>
-            <a:r>
-              <a:rPr lang="en-US" altLang="ko-KR" sz="2400" b="1" dirty="0">
-                <a:solidFill>
-                  <a:srgbClr val="0070C0"/>
-                </a:solidFill>
-              </a:rPr>
-              <a:t>”</a:t>
-            </a:r>
-          </a:p>
-        </p:txBody>
-      </p:sp>
-      <p:sp>
-        <p:nvSpPr>
-          <p:cNvPr id="4" name="직사각형 3"/>
-          <p:cNvSpPr/>
-          <p:nvPr/>
-        </p:nvSpPr>
-        <p:spPr>
-          <a:xfrm>
-            <a:off x="211015" y="1574020"/>
-            <a:ext cx="11828585" cy="3759980"/>
-          </a:xfrm>
-          <a:prstGeom prst="rect">
-            <a:avLst/>
-          </a:prstGeom>
-          <a:noFill/>
-          <a:ln>
-            <a:noFill/>
-          </a:ln>
-        </p:spPr>
-        <p:style>
-          <a:lnRef idx="2">
-            <a:schemeClr val="accent1">
-              <a:shade val="50000"/>
-            </a:schemeClr>
-          </a:lnRef>
-          <a:fillRef idx="1">
-            <a:schemeClr val="accent1"/>
-          </a:fillRef>
-          <a:effectRef idx="0">
-            <a:schemeClr val="accent1"/>
-          </a:effectRef>
-          <a:fontRef idx="minor">
-            <a:schemeClr val="lt1"/>
-          </a:fontRef>
-        </p:style>
-        <p:txBody>
-          <a:bodyPr rtlCol="0" anchor="ctr"/>
-          <a:lstStyle/>
-          <a:p>
-            <a:pPr algn="ctr"/>
-            <a:endParaRPr lang="ko-KR" altLang="en-US"/>
-          </a:p>
-        </p:txBody>
-      </p:sp>
-      <p:sp>
-        <p:nvSpPr>
-          <p:cNvPr id="5" name="TextBox 4"/>
-          <p:cNvSpPr txBox="1"/>
-          <p:nvPr/>
-        </p:nvSpPr>
-        <p:spPr>
-          <a:xfrm>
-            <a:off x="1086137" y="2690622"/>
-            <a:ext cx="9699094" cy="3447098"/>
-          </a:xfrm>
-          <a:prstGeom prst="rect">
-            <a:avLst/>
-          </a:prstGeom>
-          <a:noFill/>
-        </p:spPr>
-        <p:txBody>
-          <a:bodyPr wrap="square" rtlCol="0">
-            <a:spAutoFit/>
-          </a:bodyPr>
-          <a:lstStyle/>
-          <a:p>
-            <a:pPr marL="800100" lvl="1" indent="-342900" algn="just">
-              <a:lnSpc>
-                <a:spcPct val="200000"/>
-              </a:lnSpc>
-              <a:buFont typeface="Wingdings" panose="05000000000000000000" pitchFamily="2" charset="2"/>
-              <a:buChar char="ü"/>
-            </a:pPr>
-            <a:r>
-              <a:rPr lang="ko-KR" altLang="en-US" sz="2000" dirty="0">
-                <a:solidFill>
-                  <a:srgbClr val="002060"/>
-                </a:solidFill>
-              </a:rPr>
-              <a:t>기존 연구에 사용 되었던 </a:t>
-            </a:r>
-            <a:r>
-              <a:rPr lang="en-US" altLang="ko-KR" sz="2000" dirty="0">
-                <a:solidFill>
-                  <a:srgbClr val="002060"/>
-                </a:solidFill>
-              </a:rPr>
-              <a:t>Feature Matching</a:t>
-            </a:r>
-            <a:r>
-              <a:rPr lang="ko-KR" altLang="en-US" sz="2000" dirty="0">
-                <a:solidFill>
-                  <a:srgbClr val="002060"/>
-                </a:solidFill>
-              </a:rPr>
-              <a:t>의 단점 보완</a:t>
-            </a:r>
-            <a:endParaRPr lang="en-US" altLang="ko-KR" sz="2000" dirty="0">
-              <a:solidFill>
-                <a:srgbClr val="002060"/>
-              </a:solidFill>
-            </a:endParaRPr>
-          </a:p>
-          <a:p>
-            <a:pPr marL="800100" lvl="1" indent="-342900" algn="just">
-              <a:lnSpc>
-                <a:spcPct val="200000"/>
-              </a:lnSpc>
-              <a:buFont typeface="Wingdings" panose="05000000000000000000" pitchFamily="2" charset="2"/>
-              <a:buChar char="ü"/>
-            </a:pPr>
-            <a:r>
-              <a:rPr lang="ko-KR" altLang="en-US" sz="2000" dirty="0">
-                <a:solidFill>
-                  <a:srgbClr val="002060"/>
-                </a:solidFill>
-              </a:rPr>
-              <a:t>탐지를 위한 </a:t>
-            </a:r>
-            <a:r>
-              <a:rPr lang="en-US" altLang="ko-KR" sz="2000" dirty="0">
-                <a:solidFill>
-                  <a:srgbClr val="002060"/>
-                </a:solidFill>
-              </a:rPr>
-              <a:t>Parameter</a:t>
-            </a:r>
-            <a:r>
-              <a:rPr lang="ko-KR" altLang="en-US" sz="2000" dirty="0">
-                <a:solidFill>
-                  <a:srgbClr val="002060"/>
-                </a:solidFill>
-              </a:rPr>
-              <a:t>로 </a:t>
-            </a:r>
-            <a:r>
-              <a:rPr lang="en-US" altLang="ko-KR" sz="2000" dirty="0">
-                <a:solidFill>
-                  <a:srgbClr val="002060"/>
-                </a:solidFill>
-              </a:rPr>
-              <a:t>URL</a:t>
-            </a:r>
-            <a:r>
-              <a:rPr lang="ko-KR" altLang="en-US" sz="2000" dirty="0">
-                <a:solidFill>
-                  <a:srgbClr val="002060"/>
-                </a:solidFill>
-              </a:rPr>
-              <a:t>만 사용했을 때의 결점을 보완  </a:t>
-            </a:r>
-            <a:endParaRPr lang="en-US" altLang="ko-KR" sz="2000" dirty="0">
-              <a:solidFill>
-                <a:srgbClr val="002060"/>
-              </a:solidFill>
-            </a:endParaRPr>
-          </a:p>
-          <a:p>
-            <a:pPr marL="800100" lvl="1" indent="-342900" algn="just">
-              <a:lnSpc>
-                <a:spcPct val="200000"/>
-              </a:lnSpc>
-              <a:buFont typeface="Wingdings" panose="05000000000000000000" pitchFamily="2" charset="2"/>
-              <a:buChar char="ü"/>
-            </a:pPr>
-            <a:r>
-              <a:rPr lang="ko-KR" altLang="en-US" sz="2000" dirty="0">
-                <a:solidFill>
-                  <a:srgbClr val="002060"/>
-                </a:solidFill>
-              </a:rPr>
-              <a:t>복합적인 필터를 이용한 </a:t>
-            </a:r>
-            <a:r>
-              <a:rPr lang="en-US" altLang="ko-KR" sz="2000" dirty="0">
-                <a:solidFill>
-                  <a:srgbClr val="002060"/>
-                </a:solidFill>
-              </a:rPr>
-              <a:t>Inception V3</a:t>
-            </a:r>
-            <a:r>
-              <a:rPr lang="ko-KR" altLang="en-US" sz="2000" dirty="0">
-                <a:solidFill>
-                  <a:srgbClr val="002060"/>
-                </a:solidFill>
-              </a:rPr>
-              <a:t>를 사용하여 보다 정교한 이미지 비교</a:t>
-            </a:r>
-            <a:endParaRPr lang="en-US" altLang="ko-KR" sz="2000" dirty="0">
-              <a:solidFill>
-                <a:srgbClr val="002060"/>
-              </a:solidFill>
-            </a:endParaRPr>
-          </a:p>
-          <a:p>
-            <a:pPr marL="800100" lvl="1" indent="-342900" algn="just">
-              <a:lnSpc>
-                <a:spcPct val="200000"/>
-              </a:lnSpc>
-              <a:buFont typeface="Wingdings" panose="05000000000000000000" pitchFamily="2" charset="2"/>
-              <a:buChar char="ü"/>
-            </a:pPr>
-            <a:r>
-              <a:rPr lang="en-US" altLang="ko-KR" sz="2000" dirty="0" err="1">
-                <a:solidFill>
-                  <a:srgbClr val="002060"/>
-                </a:solidFill>
-              </a:rPr>
-              <a:t>dHash</a:t>
-            </a:r>
-            <a:r>
-              <a:rPr lang="en-US" altLang="ko-KR" sz="2000" dirty="0">
-                <a:solidFill>
-                  <a:srgbClr val="002060"/>
-                </a:solidFill>
-              </a:rPr>
-              <a:t> </a:t>
-            </a:r>
-            <a:r>
-              <a:rPr lang="ko-KR" altLang="en-US" sz="2000" dirty="0">
-                <a:solidFill>
-                  <a:srgbClr val="002060"/>
-                </a:solidFill>
-              </a:rPr>
-              <a:t>알고리즘을 이용한 이미지 유사도 정확성 개선</a:t>
-            </a:r>
-            <a:endParaRPr lang="en-US" altLang="ko-KR" sz="2000" dirty="0">
-              <a:solidFill>
-                <a:srgbClr val="002060"/>
-              </a:solidFill>
-            </a:endParaRPr>
-          </a:p>
-          <a:p>
-            <a:pPr marL="800100" lvl="1" indent="-342900" algn="just">
-              <a:lnSpc>
-                <a:spcPct val="200000"/>
-              </a:lnSpc>
-              <a:buFont typeface="Wingdings" panose="05000000000000000000" pitchFamily="2" charset="2"/>
-              <a:buChar char="ü"/>
-            </a:pPr>
-            <a:r>
-              <a:rPr lang="ko-KR" altLang="en-US" sz="2000" dirty="0">
-                <a:solidFill>
-                  <a:srgbClr val="002060"/>
-                </a:solidFill>
-              </a:rPr>
-              <a:t>국민은행을 타겟으로 설정 후 진행</a:t>
-            </a:r>
-          </a:p>
-          <a:p>
-            <a:endParaRPr lang="ko-KR" altLang="en-US" dirty="0"/>
-          </a:p>
-        </p:txBody>
-      </p:sp>
       <p:grpSp>
         <p:nvGrpSpPr>
-          <p:cNvPr id="6" name="组合 1"/>
+          <p:cNvPr id="41" name="组合 1"/>
           <p:cNvGrpSpPr/>
           <p:nvPr/>
         </p:nvGrpSpPr>
         <p:grpSpPr>
           <a:xfrm>
             <a:off x="387568" y="372475"/>
-            <a:ext cx="3949970" cy="751139"/>
+            <a:ext cx="5193100" cy="1201545"/>
             <a:chOff x="4123410" y="1826618"/>
-            <a:chExt cx="3949970" cy="751139"/>
+            <a:chExt cx="5193100" cy="1201545"/>
           </a:xfrm>
         </p:grpSpPr>
         <p:grpSp>
           <p:nvGrpSpPr>
-            <p:cNvPr id="7" name="组合 2"/>
+            <p:cNvPr id="42" name="组合 2"/>
             <p:cNvGrpSpPr/>
             <p:nvPr/>
           </p:nvGrpSpPr>
@@ -6239,7 +5853,7 @@
           </p:grpSpPr>
           <p:sp>
             <p:nvSpPr>
-              <p:cNvPr id="10" name="椭圆 6"/>
+              <p:cNvPr id="45" name="椭圆 6"/>
               <p:cNvSpPr/>
               <p:nvPr/>
             </p:nvSpPr>
@@ -6294,7 +5908,7 @@
           </p:sp>
           <p:sp>
             <p:nvSpPr>
-              <p:cNvPr id="11" name="椭圆 7"/>
+              <p:cNvPr id="46" name="椭圆 7"/>
               <p:cNvSpPr/>
               <p:nvPr/>
             </p:nvSpPr>
@@ -6348,7 +5962,7 @@
           </p:sp>
           <p:sp>
             <p:nvSpPr>
-              <p:cNvPr id="12" name="椭圆 8"/>
+              <p:cNvPr id="47" name="椭圆 8"/>
               <p:cNvSpPr/>
               <p:nvPr/>
             </p:nvSpPr>
@@ -6404,7 +6018,7 @@
           </p:sp>
           <p:sp>
             <p:nvSpPr>
-              <p:cNvPr id="13" name="椭圆 9"/>
+              <p:cNvPr id="48" name="椭圆 9"/>
               <p:cNvSpPr/>
               <p:nvPr/>
             </p:nvSpPr>
@@ -6461,14 +6075,14 @@
         </p:grpSp>
         <p:sp>
           <p:nvSpPr>
-            <p:cNvPr id="8" name="文本框 8"/>
+            <p:cNvPr id="43" name="文本框 8"/>
             <p:cNvSpPr txBox="1"/>
             <p:nvPr/>
           </p:nvSpPr>
           <p:spPr>
             <a:xfrm>
               <a:off x="4741652" y="1950945"/>
-              <a:ext cx="3331728" cy="584775"/>
+              <a:ext cx="4574858" cy="1077218"/>
             </a:xfrm>
             <a:prstGeom prst="rect">
               <a:avLst/>
@@ -6575,21 +6189,7 @@
               </a:lvl9pPr>
             </a:lstStyle>
             <a:p>
-              <a:pPr marL="0" marR="0" lvl="0" indent="0" algn="ctr" defTabSz="457200" rtl="0" eaLnBrk="1" fontAlgn="auto" latinLnBrk="0" hangingPunct="1">
-                <a:lnSpc>
-                  <a:spcPct val="100000"/>
-                </a:lnSpc>
-                <a:spcBef>
-                  <a:spcPts val="0"/>
-                </a:spcBef>
-                <a:spcAft>
-                  <a:spcPts val="0"/>
-                </a:spcAft>
-                <a:buClrTx/>
-                <a:buSzTx/>
-                <a:buFontTx/>
-                <a:buNone/>
-                <a:tabLst/>
+              <a:pPr algn="ctr">
                 <a:defRPr/>
               </a:pPr>
               <a:r>
@@ -6622,6 +6222,49 @@
                 </a:rPr>
                 <a:t>(2/2)</a:t>
               </a:r>
+              <a:r>
+                <a:rPr lang="en-US" altLang="ko-KR" sz="3200" dirty="0">
+                  <a:solidFill>
+                    <a:prstClr val="black"/>
+                  </a:solidFill>
+                </a:rPr>
+                <a:t> </a:t>
+              </a:r>
+              <a:r>
+                <a:rPr lang="en-US" altLang="ko-KR" sz="2200" dirty="0">
+                  <a:solidFill>
+                    <a:prstClr val="black"/>
+                  </a:solidFill>
+                </a:rPr>
+                <a:t>- </a:t>
+              </a:r>
+              <a:r>
+                <a:rPr lang="ko-KR" altLang="en-US" sz="2200" dirty="0">
+                  <a:solidFill>
+                    <a:prstClr val="black"/>
+                  </a:solidFill>
+                </a:rPr>
+                <a:t>순서도</a:t>
+              </a:r>
+            </a:p>
+            <a:p>
+              <a:pPr marL="0" marR="0" lvl="0" indent="0" algn="ctr" defTabSz="457200" rtl="0" eaLnBrk="1" fontAlgn="auto" latinLnBrk="0" hangingPunct="1">
+                <a:lnSpc>
+                  <a:spcPct val="100000"/>
+                </a:lnSpc>
+                <a:spcBef>
+                  <a:spcPts val="0"/>
+                </a:spcBef>
+                <a:spcAft>
+                  <a:spcPts val="0"/>
+                </a:spcAft>
+                <a:buClrTx/>
+                <a:buSzTx/>
+                <a:buFontTx/>
+                <a:buNone/>
+                <a:tabLst/>
+                <a:defRPr/>
+              </a:pPr>
               <a:endParaRPr kumimoji="1" lang="zh-CN" altLang="en-US" sz="3200" b="1" i="0" u="none" strike="noStrike" kern="1200" cap="none" spc="0" normalizeH="0" baseline="0" noProof="0" dirty="0">
                 <a:ln>
                   <a:noFill/>
@@ -6645,7 +6288,7 @@
         </p:sp>
         <p:cxnSp>
           <p:nvCxnSpPr>
-            <p:cNvPr id="9" name="直接连接符 5"/>
+            <p:cNvPr id="44" name="直接连接符 5"/>
             <p:cNvCxnSpPr/>
             <p:nvPr/>
           </p:nvCxnSpPr>
@@ -6683,14 +6326,16 @@
       </p:grpSp>
       <p:cxnSp>
         <p:nvCxnSpPr>
-          <p:cNvPr id="14" name="직선 연결선 13"/>
-          <p:cNvCxnSpPr/>
+          <p:cNvPr id="49" name="직선 연결선 48"/>
+          <p:cNvCxnSpPr>
+            <a:cxnSpLocks/>
+          </p:cNvCxnSpPr>
           <p:nvPr/>
         </p:nvCxnSpPr>
         <p:spPr>
           <a:xfrm>
             <a:off x="400140" y="1235678"/>
-            <a:ext cx="4059893" cy="26351"/>
+            <a:ext cx="5180528" cy="0"/>
           </a:xfrm>
           <a:prstGeom prst="line">
             <a:avLst/>
@@ -6711,10 +6356,140 @@
           </a:fontRef>
         </p:style>
       </p:cxnSp>
+      <p:pic>
+        <p:nvPicPr>
+          <p:cNvPr id="3" name="그림 2">
+            <a:extLst>
+              <a:ext uri="{FF2B5EF4-FFF2-40B4-BE49-F238E27FC236}">
+                <a16:creationId xmlns:a16="http://schemas.microsoft.com/office/drawing/2014/main" id="{DCECAC73-7304-4370-980D-3FF41E59DCE1}"/>
+              </a:ext>
+            </a:extLst>
+          </p:cNvPr>
+          <p:cNvPicPr>
+            <a:picLocks noChangeAspect="1"/>
+          </p:cNvPicPr>
+          <p:nvPr/>
+        </p:nvPicPr>
+        <p:blipFill>
+          <a:blip r:embed="rId2"/>
+          <a:stretch>
+            <a:fillRect/>
+          </a:stretch>
+        </p:blipFill>
+        <p:spPr>
+          <a:xfrm>
+            <a:off x="1943696" y="1784642"/>
+            <a:ext cx="7910982" cy="4861624"/>
+          </a:xfrm>
+          <a:prstGeom prst="rect">
+            <a:avLst/>
+          </a:prstGeom>
+        </p:spPr>
+      </p:pic>
+      <p:sp>
+        <p:nvSpPr>
+          <p:cNvPr id="13" name="TextBox 12">
+            <a:extLst>
+              <a:ext uri="{FF2B5EF4-FFF2-40B4-BE49-F238E27FC236}">
+                <a16:creationId xmlns:a16="http://schemas.microsoft.com/office/drawing/2014/main" id="{74D02B17-423F-4831-9637-D2DCFA9136DD}"/>
+              </a:ext>
+            </a:extLst>
+          </p:cNvPr>
+          <p:cNvSpPr txBox="1"/>
+          <p:nvPr/>
+        </p:nvSpPr>
+        <p:spPr>
+          <a:xfrm>
+            <a:off x="111271" y="1066303"/>
+            <a:ext cx="11575832" cy="718338"/>
+          </a:xfrm>
+          <a:prstGeom prst="rect">
+            <a:avLst/>
+          </a:prstGeom>
+          <a:noFill/>
+        </p:spPr>
+        <p:txBody>
+          <a:bodyPr wrap="square" rtlCol="0">
+            <a:spAutoFit/>
+          </a:bodyPr>
+          <a:lstStyle/>
+          <a:p>
+            <a:pPr algn="ctr">
+              <a:lnSpc>
+                <a:spcPct val="200000"/>
+              </a:lnSpc>
+            </a:pPr>
+            <a:r>
+              <a:rPr lang="en-US" altLang="ko-KR" sz="2400" b="1" dirty="0">
+                <a:solidFill>
+                  <a:srgbClr val="0070C0"/>
+                </a:solidFill>
+              </a:rPr>
+              <a:t>“</a:t>
+            </a:r>
+            <a:r>
+              <a:rPr lang="en-US" altLang="ko-KR" sz="2400" b="1" u="sng" dirty="0">
+                <a:solidFill>
+                  <a:srgbClr val="0070C0"/>
+                </a:solidFill>
+              </a:rPr>
+              <a:t>URL</a:t>
+            </a:r>
+            <a:r>
+              <a:rPr lang="ko-KR" altLang="en-US" sz="2400" b="1" u="sng" dirty="0">
+                <a:solidFill>
+                  <a:srgbClr val="0070C0"/>
+                </a:solidFill>
+              </a:rPr>
+              <a:t>과 </a:t>
+            </a:r>
+            <a:r>
+              <a:rPr lang="en-US" altLang="ko-KR" sz="2400" b="1" u="sng" dirty="0">
+                <a:solidFill>
+                  <a:srgbClr val="0070C0"/>
+                </a:solidFill>
+              </a:rPr>
+              <a:t>Image Comparison</a:t>
+            </a:r>
+            <a:r>
+              <a:rPr lang="ko-KR" altLang="en-US" sz="2400" b="1" u="sng" dirty="0">
+                <a:solidFill>
+                  <a:srgbClr val="0070C0"/>
+                </a:solidFill>
+              </a:rPr>
+              <a:t>을 이용한 웹사이트 위</a:t>
+            </a:r>
+            <a:r>
+              <a:rPr lang="en-US" altLang="ko-KR" sz="2400" b="1" u="sng" dirty="0">
+                <a:solidFill>
+                  <a:srgbClr val="0070C0"/>
+                </a:solidFill>
+              </a:rPr>
+              <a:t>•</a:t>
+            </a:r>
+            <a:r>
+              <a:rPr lang="ko-KR" altLang="en-US" sz="2400" b="1" u="sng" dirty="0">
+                <a:solidFill>
+                  <a:srgbClr val="0070C0"/>
+                </a:solidFill>
+              </a:rPr>
+              <a:t>변조 탐지 서비스</a:t>
+            </a:r>
+            <a:r>
+              <a:rPr lang="en-US" altLang="ko-KR" sz="2400" b="1" dirty="0">
+                <a:solidFill>
+                  <a:srgbClr val="0070C0"/>
+                </a:solidFill>
+              </a:rPr>
+              <a:t>”</a:t>
+            </a:r>
+          </a:p>
+        </p:txBody>
+      </p:sp>
     </p:spTree>
     <p:extLst>
       <p:ext uri="{BB962C8B-B14F-4D97-AF65-F5344CB8AC3E}">
-        <p14:creationId xmlns:p14="http://schemas.microsoft.com/office/powerpoint/2010/main" val="3984871178"/>
+        <p14:creationId xmlns:p14="http://schemas.microsoft.com/office/powerpoint/2010/main" val="1311663866"/>
       </p:ext>
     </p:extLst>
   </p:cSld>
@@ -8306,9 +8081,9 @@
           <p:nvPr/>
         </p:nvCxnSpPr>
         <p:spPr>
-          <a:xfrm flipV="1">
-            <a:off x="-100528" y="1126092"/>
-            <a:ext cx="3775618" cy="51105"/>
+          <a:xfrm>
+            <a:off x="301808" y="1177198"/>
+            <a:ext cx="4026084" cy="0"/>
           </a:xfrm>
           <a:prstGeom prst="line">
             <a:avLst/>
@@ -8626,7 +8401,7 @@
         </p:nvSpPr>
         <p:spPr>
           <a:xfrm>
-            <a:off x="4428011" y="2174592"/>
+            <a:off x="4245870" y="2284707"/>
             <a:ext cx="1210066" cy="369332"/>
           </a:xfrm>
           <a:prstGeom prst="rect">
@@ -8665,7 +8440,7 @@
         </p:nvSpPr>
         <p:spPr>
           <a:xfrm>
-            <a:off x="4308325" y="3070970"/>
+            <a:off x="4330793" y="3104721"/>
             <a:ext cx="1830240" cy="369332"/>
           </a:xfrm>
           <a:prstGeom prst="rect">
@@ -8792,7 +8567,7 @@
         </p:nvSpPr>
         <p:spPr>
           <a:xfrm>
-            <a:off x="4299205" y="3813295"/>
+            <a:off x="4543057" y="3874199"/>
             <a:ext cx="1518147" cy="369332"/>
           </a:xfrm>
           <a:prstGeom prst="rect">
@@ -10594,7 +10369,7 @@
         </p:nvSpPr>
         <p:spPr>
           <a:xfrm>
-            <a:off x="4188129" y="4678224"/>
+            <a:off x="4189815" y="4715673"/>
             <a:ext cx="1980765" cy="369332"/>
           </a:xfrm>
           <a:prstGeom prst="rect">
@@ -26438,127 +26213,6 @@
           <a:chExt cx="0" cy="0"/>
         </a:xfrm>
       </p:grpSpPr>
-      <p:sp>
-        <p:nvSpPr>
-          <p:cNvPr id="16" name="TextBox 15">
-            <a:extLst>
-              <a:ext uri="{FF2B5EF4-FFF2-40B4-BE49-F238E27FC236}">
-                <a16:creationId xmlns:a16="http://schemas.microsoft.com/office/drawing/2014/main" id="{08D30C9F-AF87-42FC-A9AA-D97AD690E209}"/>
-              </a:ext>
-            </a:extLst>
-          </p:cNvPr>
-          <p:cNvSpPr txBox="1"/>
-          <p:nvPr/>
-        </p:nvSpPr>
-        <p:spPr>
-          <a:xfrm>
-            <a:off x="449286" y="1302753"/>
-            <a:ext cx="11225049" cy="461665"/>
-          </a:xfrm>
-          <a:prstGeom prst="rect">
-            <a:avLst/>
-          </a:prstGeom>
-          <a:noFill/>
-        </p:spPr>
-        <p:txBody>
-          <a:bodyPr wrap="square" rtlCol="0">
-            <a:spAutoFit/>
-          </a:bodyPr>
-          <a:lstStyle/>
-          <a:p>
-            <a:pPr marL="342900" indent="-342900">
-              <a:buFont typeface="Arial" panose="020B0604020202020204" pitchFamily="34" charset="0"/>
-              <a:buChar char="•"/>
-            </a:pPr>
-            <a:r>
-              <a:rPr lang="en-US" altLang="ko-KR" sz="2400" b="1" dirty="0"/>
-              <a:t>User</a:t>
-            </a:r>
-            <a:r>
-              <a:rPr lang="ko-KR" altLang="en-US" sz="2400" b="1" dirty="0"/>
-              <a:t>가 전송한 이미지의 유사도 비교 결과 출력</a:t>
-            </a:r>
-            <a:endParaRPr lang="ko-KR" altLang="en-US" sz="2000" dirty="0"/>
-          </a:p>
-        </p:txBody>
-      </p:sp>
-      <p:sp>
-        <p:nvSpPr>
-          <p:cNvPr id="2" name="슬라이드 번호 개체 틀 1"/>
-          <p:cNvSpPr>
-            <a:spLocks noGrp="1"/>
-          </p:cNvSpPr>
-          <p:nvPr>
-            <p:ph type="sldNum" sz="quarter" idx="12"/>
-          </p:nvPr>
-        </p:nvSpPr>
-        <p:spPr/>
-        <p:txBody>
-          <a:bodyPr/>
-          <a:lstStyle/>
-          <a:p>
-            <a:pPr marL="0" marR="0" lvl="0" indent="0" algn="ctr" defTabSz="914400" rtl="0" eaLnBrk="1" fontAlgn="auto" latinLnBrk="0" hangingPunct="1">
-              <a:lnSpc>
-                <a:spcPct val="100000"/>
-              </a:lnSpc>
-              <a:spcBef>
-                <a:spcPts val="0"/>
-              </a:spcBef>
-              <a:spcAft>
-                <a:spcPts val="0"/>
-              </a:spcAft>
-              <a:buClrTx/>
-              <a:buSzTx/>
-              <a:buFontTx/>
-              <a:buNone/>
-              <a:tabLst/>
-              <a:defRPr/>
-            </a:pPr>
-            <a:fld id="{FCEE2C88-6C8F-484D-AF69-578F576B1F44}" type="slidenum">
-              <a:rPr kumimoji="0" lang="en-US" sz="1000" b="0" i="0" u="none" strike="noStrike" kern="1200" cap="none" spc="0" normalizeH="0" baseline="0" noProof="0" smtClean="0">
-                <a:ln>
-                  <a:noFill/>
-                </a:ln>
-                <a:effectLst/>
-                <a:uLnTx/>
-                <a:uFillTx/>
-                <a:latin typeface="Lato" panose="020F0502020204030203" pitchFamily="34" charset="0"/>
-                <a:ea typeface="微软雅黑"/>
-                <a:cs typeface="+mn-cs"/>
-              </a:rPr>
-              <a:pPr marL="0" marR="0" lvl="0" indent="0" algn="ctr" defTabSz="914400" rtl="0" eaLnBrk="1" fontAlgn="auto" latinLnBrk="0" hangingPunct="1">
-                <a:lnSpc>
-                  <a:spcPct val="100000"/>
-                </a:lnSpc>
-                <a:spcBef>
-                  <a:spcPts val="0"/>
-                </a:spcBef>
-                <a:spcAft>
-                  <a:spcPts val="0"/>
-                </a:spcAft>
-                <a:buClrTx/>
-                <a:buSzTx/>
-                <a:buFontTx/>
-                <a:buNone/>
-                <a:tabLst/>
-                <a:defRPr/>
-              </a:pPr>
-              <a:t>24</a:t>
-            </a:fld>
-            <a:endParaRPr kumimoji="0" lang="en-US" sz="1000" b="0" i="0" u="none" strike="noStrike" kern="1200" cap="none" spc="0" normalizeH="0" baseline="0" noProof="0" dirty="0">
-              <a:ln>
-                <a:noFill/>
-              </a:ln>
-              <a:effectLst/>
-              <a:uLnTx/>
-              <a:uFillTx/>
-              <a:latin typeface="Lato" panose="020F0502020204030203" pitchFamily="34" charset="0"/>
-              <a:ea typeface="微软雅黑"/>
-              <a:cs typeface="+mn-cs"/>
-            </a:endParaRPr>
-          </a:p>
-        </p:txBody>
-      </p:sp>
       <p:grpSp>
         <p:nvGrpSpPr>
           <p:cNvPr id="6" name="组合 1"/>
@@ -27098,6 +26752,127 @@
       </p:cxnSp>
       <p:sp>
         <p:nvSpPr>
+          <p:cNvPr id="16" name="TextBox 15">
+            <a:extLst>
+              <a:ext uri="{FF2B5EF4-FFF2-40B4-BE49-F238E27FC236}">
+                <a16:creationId xmlns:a16="http://schemas.microsoft.com/office/drawing/2014/main" id="{08D30C9F-AF87-42FC-A9AA-D97AD690E209}"/>
+              </a:ext>
+            </a:extLst>
+          </p:cNvPr>
+          <p:cNvSpPr txBox="1"/>
+          <p:nvPr/>
+        </p:nvSpPr>
+        <p:spPr>
+          <a:xfrm>
+            <a:off x="449286" y="1302753"/>
+            <a:ext cx="11225049" cy="461665"/>
+          </a:xfrm>
+          <a:prstGeom prst="rect">
+            <a:avLst/>
+          </a:prstGeom>
+          <a:noFill/>
+        </p:spPr>
+        <p:txBody>
+          <a:bodyPr wrap="square" rtlCol="0">
+            <a:spAutoFit/>
+          </a:bodyPr>
+          <a:lstStyle/>
+          <a:p>
+            <a:pPr marL="342900" indent="-342900">
+              <a:buFont typeface="Arial" panose="020B0604020202020204" pitchFamily="34" charset="0"/>
+              <a:buChar char="•"/>
+            </a:pPr>
+            <a:r>
+              <a:rPr lang="en-US" altLang="ko-KR" sz="2400" b="1" dirty="0"/>
+              <a:t>Fake </a:t>
+            </a:r>
+            <a:r>
+              <a:rPr lang="ko-KR" altLang="en-US" sz="2400" b="1" dirty="0"/>
+              <a:t>이미지의 유사도 비교 결과 출력</a:t>
+            </a:r>
+            <a:endParaRPr lang="ko-KR" altLang="en-US" sz="2000" dirty="0"/>
+          </a:p>
+        </p:txBody>
+      </p:sp>
+      <p:sp>
+        <p:nvSpPr>
+          <p:cNvPr id="2" name="슬라이드 번호 개체 틀 1"/>
+          <p:cNvSpPr>
+            <a:spLocks noGrp="1"/>
+          </p:cNvSpPr>
+          <p:nvPr>
+            <p:ph type="sldNum" sz="quarter" idx="12"/>
+          </p:nvPr>
+        </p:nvSpPr>
+        <p:spPr/>
+        <p:txBody>
+          <a:bodyPr/>
+          <a:lstStyle/>
+          <a:p>
+            <a:pPr marL="0" marR="0" lvl="0" indent="0" algn="ctr" defTabSz="914400" rtl="0" eaLnBrk="1" fontAlgn="auto" latinLnBrk="0" hangingPunct="1">
+              <a:lnSpc>
+                <a:spcPct val="100000"/>
+              </a:lnSpc>
+              <a:spcBef>
+                <a:spcPts val="0"/>
+              </a:spcBef>
+              <a:spcAft>
+                <a:spcPts val="0"/>
+              </a:spcAft>
+              <a:buClrTx/>
+              <a:buSzTx/>
+              <a:buFontTx/>
+              <a:buNone/>
+              <a:tabLst/>
+              <a:defRPr/>
+            </a:pPr>
+            <a:fld id="{FCEE2C88-6C8F-484D-AF69-578F576B1F44}" type="slidenum">
+              <a:rPr kumimoji="0" lang="en-US" sz="1000" b="0" i="0" u="none" strike="noStrike" kern="1200" cap="none" spc="0" normalizeH="0" baseline="0" noProof="0" smtClean="0">
+                <a:ln>
+                  <a:noFill/>
+                </a:ln>
+                <a:effectLst/>
+                <a:uLnTx/>
+                <a:uFillTx/>
+                <a:latin typeface="Lato" panose="020F0502020204030203" pitchFamily="34" charset="0"/>
+                <a:ea typeface="微软雅黑"/>
+                <a:cs typeface="+mn-cs"/>
+              </a:rPr>
+              <a:pPr marL="0" marR="0" lvl="0" indent="0" algn="ctr" defTabSz="914400" rtl="0" eaLnBrk="1" fontAlgn="auto" latinLnBrk="0" hangingPunct="1">
+                <a:lnSpc>
+                  <a:spcPct val="100000"/>
+                </a:lnSpc>
+                <a:spcBef>
+                  <a:spcPts val="0"/>
+                </a:spcBef>
+                <a:spcAft>
+                  <a:spcPts val="0"/>
+                </a:spcAft>
+                <a:buClrTx/>
+                <a:buSzTx/>
+                <a:buFontTx/>
+                <a:buNone/>
+                <a:tabLst/>
+                <a:defRPr/>
+              </a:pPr>
+              <a:t>24</a:t>
+            </a:fld>
+            <a:endParaRPr kumimoji="0" lang="en-US" sz="1000" b="0" i="0" u="none" strike="noStrike" kern="1200" cap="none" spc="0" normalizeH="0" baseline="0" noProof="0" dirty="0">
+              <a:ln>
+                <a:noFill/>
+              </a:ln>
+              <a:effectLst/>
+              <a:uLnTx/>
+              <a:uFillTx/>
+              <a:latin typeface="Lato" panose="020F0502020204030203" pitchFamily="34" charset="0"/>
+              <a:ea typeface="微软雅黑"/>
+              <a:cs typeface="+mn-cs"/>
+            </a:endParaRPr>
+          </a:p>
+        </p:txBody>
+      </p:sp>
+      <p:sp>
+        <p:nvSpPr>
           <p:cNvPr id="29" name="오른쪽 화살표 2">
             <a:extLst>
               <a:ext uri="{FF2B5EF4-FFF2-40B4-BE49-F238E27FC236}">
@@ -27189,115 +26964,6 @@
           </a:p>
         </p:txBody>
       </p:sp>
-      <p:grpSp>
-        <p:nvGrpSpPr>
-          <p:cNvPr id="27" name="그룹 26">
-            <a:extLst>
-              <a:ext uri="{FF2B5EF4-FFF2-40B4-BE49-F238E27FC236}">
-                <a16:creationId xmlns:a16="http://schemas.microsoft.com/office/drawing/2014/main" id="{C9847C6A-FDAA-4A3B-A695-1CAC68A3D8F1}"/>
-              </a:ext>
-            </a:extLst>
-          </p:cNvPr>
-          <p:cNvGrpSpPr/>
-          <p:nvPr/>
-        </p:nvGrpSpPr>
-        <p:grpSpPr>
-          <a:xfrm>
-            <a:off x="1109455" y="1903081"/>
-            <a:ext cx="2860608" cy="4092326"/>
-            <a:chOff x="1191913" y="1932937"/>
-            <a:chExt cx="2973239" cy="4525932"/>
-          </a:xfrm>
-        </p:grpSpPr>
-        <p:pic>
-          <p:nvPicPr>
-            <p:cNvPr id="28" name="그림 27">
-              <a:extLst>
-                <a:ext uri="{FF2B5EF4-FFF2-40B4-BE49-F238E27FC236}">
-                  <a16:creationId xmlns:a16="http://schemas.microsoft.com/office/drawing/2014/main" id="{03BD8673-11E8-4E57-8684-235BC2783AD9}"/>
-                </a:ext>
-              </a:extLst>
-            </p:cNvPr>
-            <p:cNvPicPr>
-              <a:picLocks noChangeAspect="1"/>
-            </p:cNvPicPr>
-            <p:nvPr/>
-          </p:nvPicPr>
-          <p:blipFill>
-            <a:blip r:embed="rId2" cstate="print">
-              <a:extLst>
-                <a:ext uri="{28A0092B-C50C-407E-A947-70E740481C1C}">
-                  <a14:useLocalDpi xmlns:a14="http://schemas.microsoft.com/office/drawing/2010/main" val="0"/>
-                </a:ext>
-              </a:extLst>
-            </a:blip>
-            <a:stretch>
-              <a:fillRect/>
-            </a:stretch>
-          </p:blipFill>
-          <p:spPr>
-            <a:xfrm>
-              <a:off x="1191913" y="1932937"/>
-              <a:ext cx="2973239" cy="4525932"/>
-            </a:xfrm>
-            <a:prstGeom prst="rect">
-              <a:avLst/>
-            </a:prstGeom>
-          </p:spPr>
-        </p:pic>
-        <p:sp>
-          <p:nvSpPr>
-            <p:cNvPr id="30" name="직사각형 29">
-              <a:extLst>
-                <a:ext uri="{FF2B5EF4-FFF2-40B4-BE49-F238E27FC236}">
-                  <a16:creationId xmlns:a16="http://schemas.microsoft.com/office/drawing/2014/main" id="{839DA4DB-B836-4AA9-88A5-5E1950E23E23}"/>
-                </a:ext>
-              </a:extLst>
-            </p:cNvPr>
-            <p:cNvSpPr/>
-            <p:nvPr/>
-          </p:nvSpPr>
-          <p:spPr>
-            <a:xfrm>
-              <a:off x="1678880" y="2682239"/>
-              <a:ext cx="303657" cy="138863"/>
-            </a:xfrm>
-            <a:prstGeom prst="rect">
-              <a:avLst/>
-            </a:prstGeom>
-            <a:noFill/>
-            <a:ln w="38100">
-              <a:solidFill>
-                <a:srgbClr val="F23B48"/>
-              </a:solidFill>
-            </a:ln>
-          </p:spPr>
-          <p:style>
-            <a:lnRef idx="2">
-              <a:schemeClr val="accent1">
-                <a:shade val="50000"/>
-              </a:schemeClr>
-            </a:lnRef>
-            <a:fillRef idx="1">
-              <a:schemeClr val="accent1"/>
-            </a:fillRef>
-            <a:effectRef idx="0">
-              <a:schemeClr val="accent1"/>
-            </a:effectRef>
-            <a:fontRef idx="minor">
-              <a:schemeClr val="lt1"/>
-            </a:fontRef>
-          </p:style>
-          <p:txBody>
-            <a:bodyPr rtlCol="0" anchor="ctr"/>
-            <a:lstStyle/>
-            <a:p>
-              <a:pPr algn="ctr"/>
-              <a:endParaRPr lang="ko-KR" altLang="en-US"/>
-            </a:p>
-          </p:txBody>
-        </p:sp>
-      </p:grpSp>
       <p:sp>
         <p:nvSpPr>
           <p:cNvPr id="23" name="TextBox 22">
@@ -27312,7 +26978,7 @@
         </p:nvSpPr>
         <p:spPr>
           <a:xfrm>
-            <a:off x="7454856" y="4753030"/>
+            <a:off x="7436195" y="4753030"/>
             <a:ext cx="3044858" cy="369332"/>
           </a:xfrm>
           <a:prstGeom prst="rect">
@@ -27332,15 +26998,7 @@
                   <a:srgbClr val="6600FF"/>
                 </a:solidFill>
               </a:rPr>
-              <a:t>User Image: </a:t>
-            </a:r>
-            <a:r>
-              <a:rPr lang="en-US" altLang="ko-KR" dirty="0" smtClean="0">
-                <a:solidFill>
-                  <a:srgbClr val="6600FF"/>
-                </a:solidFill>
-              </a:rPr>
-              <a:t>0.489</a:t>
+              <a:t>User Image: 0.763</a:t>
             </a:r>
             <a:endParaRPr lang="ko-KR" altLang="en-US" dirty="0">
               <a:solidFill>
@@ -27363,7 +27021,7 @@
           <p:nvPr/>
         </p:nvPicPr>
         <p:blipFill>
-          <a:blip r:embed="rId3"/>
+          <a:blip r:embed="rId2"/>
           <a:stretch>
             <a:fillRect/>
           </a:stretch>
@@ -27378,6 +27036,94 @@
           </a:prstGeom>
         </p:spPr>
       </p:pic>
+      <p:pic>
+        <p:nvPicPr>
+          <p:cNvPr id="20" name="그림 19">
+            <a:extLst>
+              <a:ext uri="{FF2B5EF4-FFF2-40B4-BE49-F238E27FC236}">
+                <a16:creationId xmlns:a16="http://schemas.microsoft.com/office/drawing/2014/main" id="{60624A10-8B8C-429B-AF6A-9D88C7FD02AA}"/>
+              </a:ext>
+            </a:extLst>
+          </p:cNvPr>
+          <p:cNvPicPr>
+            <a:picLocks noChangeAspect="1"/>
+          </p:cNvPicPr>
+          <p:nvPr/>
+        </p:nvPicPr>
+        <p:blipFill>
+          <a:blip r:embed="rId3" cstate="print">
+            <a:extLst>
+              <a:ext uri="{28A0092B-C50C-407E-A947-70E740481C1C}">
+                <a14:useLocalDpi xmlns:a14="http://schemas.microsoft.com/office/drawing/2010/main" val="0"/>
+              </a:ext>
+            </a:extLst>
+          </a:blip>
+          <a:stretch>
+            <a:fillRect/>
+          </a:stretch>
+        </p:blipFill>
+        <p:spPr>
+          <a:xfrm>
+            <a:off x="1416862" y="2098999"/>
+            <a:ext cx="2812972" cy="4281968"/>
+          </a:xfrm>
+          <a:prstGeom prst="rect">
+            <a:avLst/>
+          </a:prstGeom>
+        </p:spPr>
+      </p:pic>
+      <p:sp>
+        <p:nvSpPr>
+          <p:cNvPr id="21" name="직사각형 20">
+            <a:extLst>
+              <a:ext uri="{FF2B5EF4-FFF2-40B4-BE49-F238E27FC236}">
+                <a16:creationId xmlns:a16="http://schemas.microsoft.com/office/drawing/2014/main" id="{CDDE3803-C028-4C7F-BDD1-90B5A7A81D8B}"/>
+              </a:ext>
+            </a:extLst>
+          </p:cNvPr>
+          <p:cNvSpPr/>
+          <p:nvPr/>
+        </p:nvSpPr>
+        <p:spPr>
+          <a:xfrm>
+            <a:off x="2370454" y="3464642"/>
+            <a:ext cx="689737" cy="278302"/>
+          </a:xfrm>
+          <a:prstGeom prst="rect">
+            <a:avLst/>
+          </a:prstGeom>
+          <a:noFill/>
+          <a:ln w="38100">
+            <a:solidFill>
+              <a:srgbClr val="F23B48"/>
+            </a:solidFill>
+          </a:ln>
+        </p:spPr>
+        <p:style>
+          <a:lnRef idx="2">
+            <a:schemeClr val="accent1">
+              <a:shade val="50000"/>
+            </a:schemeClr>
+          </a:lnRef>
+          <a:fillRef idx="1">
+            <a:schemeClr val="accent1"/>
+          </a:fillRef>
+          <a:effectRef idx="0">
+            <a:schemeClr val="accent1"/>
+          </a:effectRef>
+          <a:fontRef idx="minor">
+            <a:schemeClr val="lt1"/>
+          </a:fontRef>
+        </p:style>
+        <p:txBody>
+          <a:bodyPr rtlCol="0" anchor="ctr"/>
+          <a:lstStyle/>
+          <a:p>
+            <a:pPr algn="ctr"/>
+            <a:endParaRPr lang="ko-KR" altLang="en-US"/>
+          </a:p>
+        </p:txBody>
+      </p:sp>
     </p:spTree>
     <p:extLst>
       <p:ext uri="{BB962C8B-B14F-4D97-AF65-F5344CB8AC3E}">
@@ -28395,115 +28141,6 @@
           </a:p>
         </p:txBody>
       </p:sp>
-      <p:grpSp>
-        <p:nvGrpSpPr>
-          <p:cNvPr id="22" name="그룹 21">
-            <a:extLst>
-              <a:ext uri="{FF2B5EF4-FFF2-40B4-BE49-F238E27FC236}">
-                <a16:creationId xmlns:a16="http://schemas.microsoft.com/office/drawing/2014/main" id="{E1B18942-EBC6-4FCD-B159-57607EB6249D}"/>
-              </a:ext>
-            </a:extLst>
-          </p:cNvPr>
-          <p:cNvGrpSpPr/>
-          <p:nvPr/>
-        </p:nvGrpSpPr>
-        <p:grpSpPr>
-          <a:xfrm>
-            <a:off x="1191913" y="1932937"/>
-            <a:ext cx="2973239" cy="4525932"/>
-            <a:chOff x="1191913" y="1932937"/>
-            <a:chExt cx="2973239" cy="4525932"/>
-          </a:xfrm>
-        </p:grpSpPr>
-        <p:pic>
-          <p:nvPicPr>
-            <p:cNvPr id="5" name="그림 4">
-              <a:extLst>
-                <a:ext uri="{FF2B5EF4-FFF2-40B4-BE49-F238E27FC236}">
-                  <a16:creationId xmlns:a16="http://schemas.microsoft.com/office/drawing/2014/main" id="{84F26FAA-6CF2-4227-8C9D-413E2B05EA94}"/>
-                </a:ext>
-              </a:extLst>
-            </p:cNvPr>
-            <p:cNvPicPr>
-              <a:picLocks noChangeAspect="1"/>
-            </p:cNvPicPr>
-            <p:nvPr/>
-          </p:nvPicPr>
-          <p:blipFill>
-            <a:blip r:embed="rId2" cstate="print">
-              <a:extLst>
-                <a:ext uri="{28A0092B-C50C-407E-A947-70E740481C1C}">
-                  <a14:useLocalDpi xmlns:a14="http://schemas.microsoft.com/office/drawing/2010/main" val="0"/>
-                </a:ext>
-              </a:extLst>
-            </a:blip>
-            <a:stretch>
-              <a:fillRect/>
-            </a:stretch>
-          </p:blipFill>
-          <p:spPr>
-            <a:xfrm>
-              <a:off x="1191913" y="1932937"/>
-              <a:ext cx="2973239" cy="4525932"/>
-            </a:xfrm>
-            <a:prstGeom prst="rect">
-              <a:avLst/>
-            </a:prstGeom>
-          </p:spPr>
-        </p:pic>
-        <p:sp>
-          <p:nvSpPr>
-            <p:cNvPr id="19" name="직사각형 18">
-              <a:extLst>
-                <a:ext uri="{FF2B5EF4-FFF2-40B4-BE49-F238E27FC236}">
-                  <a16:creationId xmlns:a16="http://schemas.microsoft.com/office/drawing/2014/main" id="{EBBAE28A-1158-4DF7-AC49-4645F7F8E798}"/>
-                </a:ext>
-              </a:extLst>
-            </p:cNvPr>
-            <p:cNvSpPr/>
-            <p:nvPr/>
-          </p:nvSpPr>
-          <p:spPr>
-            <a:xfrm>
-              <a:off x="1678880" y="2682239"/>
-              <a:ext cx="303657" cy="138863"/>
-            </a:xfrm>
-            <a:prstGeom prst="rect">
-              <a:avLst/>
-            </a:prstGeom>
-            <a:noFill/>
-            <a:ln w="38100">
-              <a:solidFill>
-                <a:srgbClr val="F23B48"/>
-              </a:solidFill>
-            </a:ln>
-          </p:spPr>
-          <p:style>
-            <a:lnRef idx="2">
-              <a:schemeClr val="accent1">
-                <a:shade val="50000"/>
-              </a:schemeClr>
-            </a:lnRef>
-            <a:fillRef idx="1">
-              <a:schemeClr val="accent1"/>
-            </a:fillRef>
-            <a:effectRef idx="0">
-              <a:schemeClr val="accent1"/>
-            </a:effectRef>
-            <a:fontRef idx="minor">
-              <a:schemeClr val="lt1"/>
-            </a:fontRef>
-          </p:style>
-          <p:txBody>
-            <a:bodyPr rtlCol="0" anchor="ctr"/>
-            <a:lstStyle/>
-            <a:p>
-              <a:pPr algn="ctr"/>
-              <a:endParaRPr lang="ko-KR" altLang="en-US"/>
-            </a:p>
-          </p:txBody>
-        </p:sp>
-      </p:grpSp>
       <p:sp>
         <p:nvSpPr>
           <p:cNvPr id="23" name="오른쪽 화살표 2">
@@ -29160,7 +28797,7 @@
           <p:nvPr/>
         </p:nvPicPr>
         <p:blipFill>
-          <a:blip r:embed="rId3"/>
+          <a:blip r:embed="rId2"/>
           <a:stretch>
             <a:fillRect/>
           </a:stretch>
@@ -29175,6 +28812,94 @@
           </a:prstGeom>
         </p:spPr>
       </p:pic>
+      <p:pic>
+        <p:nvPicPr>
+          <p:cNvPr id="21" name="그림 20">
+            <a:extLst>
+              <a:ext uri="{FF2B5EF4-FFF2-40B4-BE49-F238E27FC236}">
+                <a16:creationId xmlns:a16="http://schemas.microsoft.com/office/drawing/2014/main" id="{1742331A-41D1-496B-ACD3-7F444464C6A2}"/>
+              </a:ext>
+            </a:extLst>
+          </p:cNvPr>
+          <p:cNvPicPr>
+            <a:picLocks noChangeAspect="1"/>
+          </p:cNvPicPr>
+          <p:nvPr/>
+        </p:nvPicPr>
+        <p:blipFill>
+          <a:blip r:embed="rId3" cstate="print">
+            <a:extLst>
+              <a:ext uri="{28A0092B-C50C-407E-A947-70E740481C1C}">
+                <a14:useLocalDpi xmlns:a14="http://schemas.microsoft.com/office/drawing/2010/main" val="0"/>
+              </a:ext>
+            </a:extLst>
+          </a:blip>
+          <a:stretch>
+            <a:fillRect/>
+          </a:stretch>
+        </p:blipFill>
+        <p:spPr>
+          <a:xfrm>
+            <a:off x="1416862" y="2098999"/>
+            <a:ext cx="2812972" cy="4281968"/>
+          </a:xfrm>
+          <a:prstGeom prst="rect">
+            <a:avLst/>
+          </a:prstGeom>
+        </p:spPr>
+      </p:pic>
+      <p:sp>
+        <p:nvSpPr>
+          <p:cNvPr id="24" name="직사각형 23">
+            <a:extLst>
+              <a:ext uri="{FF2B5EF4-FFF2-40B4-BE49-F238E27FC236}">
+                <a16:creationId xmlns:a16="http://schemas.microsoft.com/office/drawing/2014/main" id="{D245B70C-4AEA-42C0-AC05-691A5FEEF08A}"/>
+              </a:ext>
+            </a:extLst>
+          </p:cNvPr>
+          <p:cNvSpPr/>
+          <p:nvPr/>
+        </p:nvSpPr>
+        <p:spPr>
+          <a:xfrm>
+            <a:off x="2370454" y="3464642"/>
+            <a:ext cx="689737" cy="278302"/>
+          </a:xfrm>
+          <a:prstGeom prst="rect">
+            <a:avLst/>
+          </a:prstGeom>
+          <a:noFill/>
+          <a:ln w="38100">
+            <a:solidFill>
+              <a:srgbClr val="F23B48"/>
+            </a:solidFill>
+          </a:ln>
+        </p:spPr>
+        <p:style>
+          <a:lnRef idx="2">
+            <a:schemeClr val="accent1">
+              <a:shade val="50000"/>
+            </a:schemeClr>
+          </a:lnRef>
+          <a:fillRef idx="1">
+            <a:schemeClr val="accent1"/>
+          </a:fillRef>
+          <a:effectRef idx="0">
+            <a:schemeClr val="accent1"/>
+          </a:effectRef>
+          <a:fontRef idx="minor">
+            <a:schemeClr val="lt1"/>
+          </a:fontRef>
+        </p:style>
+        <p:txBody>
+          <a:bodyPr rtlCol="0" anchor="ctr"/>
+          <a:lstStyle/>
+          <a:p>
+            <a:pPr algn="ctr"/>
+            <a:endParaRPr lang="ko-KR" altLang="en-US"/>
+          </a:p>
+        </p:txBody>
+      </p:sp>
     </p:spTree>
     <p:extLst>
       <p:ext uri="{BB962C8B-B14F-4D97-AF65-F5344CB8AC3E}">
@@ -48908,23 +48633,372 @@
           </a:p>
         </p:txBody>
       </p:sp>
+      <p:sp>
+        <p:nvSpPr>
+          <p:cNvPr id="3" name="TextBox 2"/>
+          <p:cNvSpPr txBox="1"/>
+          <p:nvPr/>
+        </p:nvSpPr>
+        <p:spPr>
+          <a:xfrm>
+            <a:off x="387568" y="1663780"/>
+            <a:ext cx="11575832" cy="718338"/>
+          </a:xfrm>
+          <a:prstGeom prst="rect">
+            <a:avLst/>
+          </a:prstGeom>
+          <a:noFill/>
+        </p:spPr>
+        <p:txBody>
+          <a:bodyPr wrap="square" rtlCol="0">
+            <a:spAutoFit/>
+          </a:bodyPr>
+          <a:lstStyle/>
+          <a:p>
+            <a:pPr algn="ctr">
+              <a:lnSpc>
+                <a:spcPct val="200000"/>
+              </a:lnSpc>
+            </a:pPr>
+            <a:r>
+              <a:rPr lang="en-US" altLang="ko-KR" sz="2400" b="1" dirty="0">
+                <a:solidFill>
+                  <a:srgbClr val="0070C0"/>
+                </a:solidFill>
+              </a:rPr>
+              <a:t>“</a:t>
+            </a:r>
+            <a:r>
+              <a:rPr lang="en-US" altLang="ko-KR" sz="2400" b="1" u="sng" dirty="0">
+                <a:solidFill>
+                  <a:srgbClr val="0070C0"/>
+                </a:solidFill>
+              </a:rPr>
+              <a:t>URL</a:t>
+            </a:r>
+            <a:r>
+              <a:rPr lang="ko-KR" altLang="en-US" sz="2400" b="1" u="sng" dirty="0">
+                <a:solidFill>
+                  <a:srgbClr val="0070C0"/>
+                </a:solidFill>
+              </a:rPr>
+              <a:t>과 </a:t>
+            </a:r>
+            <a:r>
+              <a:rPr lang="en-US" altLang="ko-KR" sz="2400" b="1" u="sng" dirty="0">
+                <a:solidFill>
+                  <a:srgbClr val="0070C0"/>
+                </a:solidFill>
+              </a:rPr>
+              <a:t>Image Comparison</a:t>
+            </a:r>
+            <a:r>
+              <a:rPr lang="ko-KR" altLang="en-US" sz="2400" b="1" u="sng" dirty="0">
+                <a:solidFill>
+                  <a:srgbClr val="0070C0"/>
+                </a:solidFill>
+              </a:rPr>
+              <a:t>을 이용한 웹사이트 위</a:t>
+            </a:r>
+            <a:r>
+              <a:rPr lang="en-US" altLang="ko-KR" sz="2400" b="1" u="sng" dirty="0">
+                <a:solidFill>
+                  <a:srgbClr val="0070C0"/>
+                </a:solidFill>
+              </a:rPr>
+              <a:t>•</a:t>
+            </a:r>
+            <a:r>
+              <a:rPr lang="ko-KR" altLang="en-US" sz="2400" b="1" u="sng" dirty="0">
+                <a:solidFill>
+                  <a:srgbClr val="0070C0"/>
+                </a:solidFill>
+              </a:rPr>
+              <a:t>변조 탐지 서비스</a:t>
+            </a:r>
+            <a:r>
+              <a:rPr lang="en-US" altLang="ko-KR" sz="2400" b="1" dirty="0">
+                <a:solidFill>
+                  <a:srgbClr val="0070C0"/>
+                </a:solidFill>
+              </a:rPr>
+              <a:t>”</a:t>
+            </a:r>
+          </a:p>
+        </p:txBody>
+      </p:sp>
+      <p:sp>
+        <p:nvSpPr>
+          <p:cNvPr id="4" name="직사각형 3"/>
+          <p:cNvSpPr/>
+          <p:nvPr/>
+        </p:nvSpPr>
+        <p:spPr>
+          <a:xfrm>
+            <a:off x="211015" y="1574020"/>
+            <a:ext cx="11828585" cy="3759980"/>
+          </a:xfrm>
+          <a:prstGeom prst="rect">
+            <a:avLst/>
+          </a:prstGeom>
+          <a:noFill/>
+          <a:ln>
+            <a:noFill/>
+          </a:ln>
+        </p:spPr>
+        <p:style>
+          <a:lnRef idx="2">
+            <a:schemeClr val="accent1">
+              <a:shade val="50000"/>
+            </a:schemeClr>
+          </a:lnRef>
+          <a:fillRef idx="1">
+            <a:schemeClr val="accent1"/>
+          </a:fillRef>
+          <a:effectRef idx="0">
+            <a:schemeClr val="accent1"/>
+          </a:effectRef>
+          <a:fontRef idx="minor">
+            <a:schemeClr val="lt1"/>
+          </a:fontRef>
+        </p:style>
+        <p:txBody>
+          <a:bodyPr rtlCol="0" anchor="ctr"/>
+          <a:lstStyle/>
+          <a:p>
+            <a:pPr algn="ctr"/>
+            <a:endParaRPr lang="ko-KR" altLang="en-US"/>
+          </a:p>
+        </p:txBody>
+      </p:sp>
+      <p:sp>
+        <p:nvSpPr>
+          <p:cNvPr id="5" name="TextBox 4"/>
+          <p:cNvSpPr txBox="1"/>
+          <p:nvPr/>
+        </p:nvSpPr>
+        <p:spPr>
+          <a:xfrm>
+            <a:off x="1086137" y="2690622"/>
+            <a:ext cx="9699094" cy="3447098"/>
+          </a:xfrm>
+          <a:prstGeom prst="rect">
+            <a:avLst/>
+          </a:prstGeom>
+          <a:noFill/>
+        </p:spPr>
+        <p:txBody>
+          <a:bodyPr wrap="square" rtlCol="0">
+            <a:spAutoFit/>
+          </a:bodyPr>
+          <a:lstStyle/>
+          <a:p>
+            <a:pPr marL="800100" lvl="1" indent="-342900" algn="just">
+              <a:lnSpc>
+                <a:spcPct val="200000"/>
+              </a:lnSpc>
+              <a:buFont typeface="Wingdings" panose="05000000000000000000" pitchFamily="2" charset="2"/>
+              <a:buChar char="ü"/>
+            </a:pPr>
+            <a:r>
+              <a:rPr lang="ko-KR" altLang="en-US" sz="2000" dirty="0">
+                <a:solidFill>
+                  <a:srgbClr val="002060"/>
+                </a:solidFill>
+              </a:rPr>
+              <a:t>기존 연구에 사용 되었던 </a:t>
+            </a:r>
+            <a:r>
+              <a:rPr lang="en-US" altLang="ko-KR" sz="2000" dirty="0">
+                <a:solidFill>
+                  <a:srgbClr val="002060"/>
+                </a:solidFill>
+              </a:rPr>
+              <a:t>Feature Matching</a:t>
+            </a:r>
+            <a:r>
+              <a:rPr lang="ko-KR" altLang="en-US" sz="2000" dirty="0">
+                <a:solidFill>
+                  <a:srgbClr val="002060"/>
+                </a:solidFill>
+              </a:rPr>
+              <a:t>의 단점 보완</a:t>
+            </a:r>
+            <a:endParaRPr lang="en-US" altLang="ko-KR" sz="2000" dirty="0">
+              <a:solidFill>
+                <a:srgbClr val="002060"/>
+              </a:solidFill>
+            </a:endParaRPr>
+          </a:p>
+          <a:p>
+            <a:pPr marL="800100" lvl="1" indent="-342900" algn="just">
+              <a:lnSpc>
+                <a:spcPct val="200000"/>
+              </a:lnSpc>
+              <a:buFont typeface="Wingdings" panose="05000000000000000000" pitchFamily="2" charset="2"/>
+              <a:buChar char="ü"/>
+            </a:pPr>
+            <a:r>
+              <a:rPr lang="ko-KR" altLang="en-US" sz="2000" dirty="0">
+                <a:solidFill>
+                  <a:srgbClr val="002060"/>
+                </a:solidFill>
+              </a:rPr>
+              <a:t>탐지를 위한 </a:t>
+            </a:r>
+            <a:r>
+              <a:rPr lang="en-US" altLang="ko-KR" sz="2000" dirty="0">
+                <a:solidFill>
+                  <a:srgbClr val="002060"/>
+                </a:solidFill>
+              </a:rPr>
+              <a:t>Parameter</a:t>
+            </a:r>
+            <a:r>
+              <a:rPr lang="ko-KR" altLang="en-US" sz="2000" dirty="0">
+                <a:solidFill>
+                  <a:srgbClr val="002060"/>
+                </a:solidFill>
+              </a:rPr>
+              <a:t>로 </a:t>
+            </a:r>
+            <a:r>
+              <a:rPr lang="en-US" altLang="ko-KR" sz="2000" dirty="0">
+                <a:solidFill>
+                  <a:srgbClr val="002060"/>
+                </a:solidFill>
+              </a:rPr>
+              <a:t>URL</a:t>
+            </a:r>
+            <a:r>
+              <a:rPr lang="ko-KR" altLang="en-US" sz="2000" dirty="0">
+                <a:solidFill>
+                  <a:srgbClr val="002060"/>
+                </a:solidFill>
+              </a:rPr>
+              <a:t>만 사용했을 때의 결점을 보완  </a:t>
+            </a:r>
+            <a:endParaRPr lang="en-US" altLang="ko-KR" sz="2000" dirty="0">
+              <a:solidFill>
+                <a:srgbClr val="002060"/>
+              </a:solidFill>
+            </a:endParaRPr>
+          </a:p>
+          <a:p>
+            <a:pPr marL="800100" lvl="1" indent="-342900" algn="just">
+              <a:lnSpc>
+                <a:spcPct val="200000"/>
+              </a:lnSpc>
+              <a:buFont typeface="Wingdings" panose="05000000000000000000" pitchFamily="2" charset="2"/>
+              <a:buChar char="ü"/>
+            </a:pPr>
+            <a:r>
+              <a:rPr lang="ko-KR" altLang="en-US" sz="2000" dirty="0">
+                <a:solidFill>
+                  <a:srgbClr val="002060"/>
+                </a:solidFill>
+              </a:rPr>
+              <a:t>복합적인 필터를 이용한 </a:t>
+            </a:r>
+            <a:r>
+              <a:rPr lang="en-US" altLang="ko-KR" sz="2000" dirty="0">
+                <a:solidFill>
+                  <a:srgbClr val="002060"/>
+                </a:solidFill>
+              </a:rPr>
+              <a:t>Inception V3</a:t>
+            </a:r>
+            <a:r>
+              <a:rPr lang="ko-KR" altLang="en-US" sz="2000" dirty="0">
+                <a:solidFill>
+                  <a:srgbClr val="002060"/>
+                </a:solidFill>
+              </a:rPr>
+              <a:t>를 사용하여 보다 정교한 이미지 비교</a:t>
+            </a:r>
+            <a:endParaRPr lang="en-US" altLang="ko-KR" sz="2000" dirty="0">
+              <a:solidFill>
+                <a:srgbClr val="002060"/>
+              </a:solidFill>
+            </a:endParaRPr>
+          </a:p>
+          <a:p>
+            <a:pPr marL="800100" lvl="1" indent="-342900" algn="just">
+              <a:lnSpc>
+                <a:spcPct val="200000"/>
+              </a:lnSpc>
+              <a:buFont typeface="Wingdings" panose="05000000000000000000" pitchFamily="2" charset="2"/>
+              <a:buChar char="ü"/>
+            </a:pPr>
+            <a:r>
+              <a:rPr lang="en-US" altLang="ko-KR" sz="2000" dirty="0" err="1">
+                <a:solidFill>
+                  <a:srgbClr val="002060"/>
+                </a:solidFill>
+              </a:rPr>
+              <a:t>dHash</a:t>
+            </a:r>
+            <a:r>
+              <a:rPr lang="en-US" altLang="ko-KR" sz="2000" dirty="0">
+                <a:solidFill>
+                  <a:srgbClr val="002060"/>
+                </a:solidFill>
+              </a:rPr>
+              <a:t> </a:t>
+            </a:r>
+            <a:r>
+              <a:rPr lang="ko-KR" altLang="en-US" sz="2000" dirty="0">
+                <a:solidFill>
+                  <a:srgbClr val="002060"/>
+                </a:solidFill>
+              </a:rPr>
+              <a:t>알고리즘을 이용한 이미지 유사도 정확성 개선</a:t>
+            </a:r>
+            <a:endParaRPr lang="en-US" altLang="ko-KR" sz="2000" dirty="0">
+              <a:solidFill>
+                <a:srgbClr val="002060"/>
+              </a:solidFill>
+            </a:endParaRPr>
+          </a:p>
+          <a:p>
+            <a:pPr marL="800100" lvl="1" indent="-342900" algn="just">
+              <a:lnSpc>
+                <a:spcPct val="200000"/>
+              </a:lnSpc>
+              <a:buFont typeface="Wingdings" panose="05000000000000000000" pitchFamily="2" charset="2"/>
+              <a:buChar char="ü"/>
+            </a:pPr>
+            <a:r>
+              <a:rPr lang="ko-KR" altLang="en-US" sz="2000" dirty="0">
+                <a:solidFill>
+                  <a:srgbClr val="002060"/>
+                </a:solidFill>
+              </a:rPr>
+              <a:t>국민은행을 타겟으로 설정 후 진행</a:t>
+            </a:r>
+          </a:p>
+          <a:p>
+            <a:endParaRPr lang="ko-KR" altLang="en-US" dirty="0"/>
+          </a:p>
+        </p:txBody>
+      </p:sp>
       <p:grpSp>
         <p:nvGrpSpPr>
-          <p:cNvPr id="41" name="组合 1"/>
+          <p:cNvPr id="6" name="组合 1"/>
           <p:cNvGrpSpPr/>
           <p:nvPr/>
         </p:nvGrpSpPr>
         <p:grpSpPr>
           <a:xfrm>
             <a:off x="387568" y="372475"/>
-            <a:ext cx="5193100" cy="1201545"/>
+            <a:ext cx="3949970" cy="751139"/>
             <a:chOff x="4123410" y="1826618"/>
-            <a:chExt cx="5193100" cy="1201545"/>
+            <a:chExt cx="3949970" cy="751139"/>
           </a:xfrm>
         </p:grpSpPr>
         <p:grpSp>
           <p:nvGrpSpPr>
-            <p:cNvPr id="42" name="组合 2"/>
+            <p:cNvPr id="7" name="组合 2"/>
             <p:cNvGrpSpPr/>
             <p:nvPr/>
           </p:nvGrpSpPr>
@@ -48938,7 +49012,7 @@
           </p:grpSpPr>
           <p:sp>
             <p:nvSpPr>
-              <p:cNvPr id="45" name="椭圆 6"/>
+              <p:cNvPr id="10" name="椭圆 6"/>
               <p:cNvSpPr/>
               <p:nvPr/>
             </p:nvSpPr>
@@ -48993,7 +49067,7 @@
           </p:sp>
           <p:sp>
             <p:nvSpPr>
-              <p:cNvPr id="46" name="椭圆 7"/>
+              <p:cNvPr id="11" name="椭圆 7"/>
               <p:cNvSpPr/>
               <p:nvPr/>
             </p:nvSpPr>
@@ -49047,7 +49121,7 @@
           </p:sp>
           <p:sp>
             <p:nvSpPr>
-              <p:cNvPr id="47" name="椭圆 8"/>
+              <p:cNvPr id="12" name="椭圆 8"/>
               <p:cNvSpPr/>
               <p:nvPr/>
             </p:nvSpPr>
@@ -49103,7 +49177,7 @@
           </p:sp>
           <p:sp>
             <p:nvSpPr>
-              <p:cNvPr id="48" name="椭圆 9"/>
+              <p:cNvPr id="13" name="椭圆 9"/>
               <p:cNvSpPr/>
               <p:nvPr/>
             </p:nvSpPr>
@@ -49160,14 +49234,14 @@
         </p:grpSp>
         <p:sp>
           <p:nvSpPr>
-            <p:cNvPr id="43" name="文本框 8"/>
+            <p:cNvPr id="8" name="文本框 8"/>
             <p:cNvSpPr txBox="1"/>
             <p:nvPr/>
           </p:nvSpPr>
           <p:spPr>
             <a:xfrm>
               <a:off x="4741652" y="1950945"/>
-              <a:ext cx="4574858" cy="1077218"/>
+              <a:ext cx="3331728" cy="584775"/>
             </a:xfrm>
             <a:prstGeom prst="rect">
               <a:avLst/>
@@ -49274,7 +49348,21 @@
               </a:lvl9pPr>
             </a:lstStyle>
             <a:p>
-              <a:pPr algn="ctr">
+              <a:pPr marL="0" marR="0" lvl="0" indent="0" algn="ctr" defTabSz="457200" rtl="0" eaLnBrk="1" fontAlgn="auto" latinLnBrk="0" hangingPunct="1">
+                <a:lnSpc>
+                  <a:spcPct val="100000"/>
+                </a:lnSpc>
+                <a:spcBef>
+                  <a:spcPts val="0"/>
+                </a:spcBef>
+                <a:spcAft>
+                  <a:spcPts val="0"/>
+                </a:spcAft>
+                <a:buClrTx/>
+                <a:buSzTx/>
+                <a:buFontTx/>
+                <a:buNone/>
+                <a:tabLst/>
                 <a:defRPr/>
               </a:pPr>
               <a:r>
@@ -49307,49 +49395,6 @@
                 </a:rPr>
                 <a:t>(1/2)</a:t>
               </a:r>
-              <a:r>
-                <a:rPr lang="en-US" altLang="ko-KR" sz="3200" dirty="0">
-                  <a:solidFill>
-                    <a:prstClr val="black"/>
-                  </a:solidFill>
-                </a:rPr>
-                <a:t> </a:t>
-              </a:r>
-              <a:r>
-                <a:rPr lang="en-US" altLang="ko-KR" sz="2200" dirty="0">
-                  <a:solidFill>
-                    <a:prstClr val="black"/>
-                  </a:solidFill>
-                </a:rPr>
-                <a:t>- </a:t>
-              </a:r>
-              <a:r>
-                <a:rPr lang="ko-KR" altLang="en-US" sz="2200" dirty="0">
-                  <a:solidFill>
-                    <a:prstClr val="black"/>
-                  </a:solidFill>
-                </a:rPr>
-                <a:t>순서도</a:t>
-              </a:r>
-            </a:p>
-            <a:p>
-              <a:pPr marL="0" marR="0" lvl="0" indent="0" algn="ctr" defTabSz="457200" rtl="0" eaLnBrk="1" fontAlgn="auto" latinLnBrk="0" hangingPunct="1">
-                <a:lnSpc>
-                  <a:spcPct val="100000"/>
-                </a:lnSpc>
-                <a:spcBef>
-                  <a:spcPts val="0"/>
-                </a:spcBef>
-                <a:spcAft>
-                  <a:spcPts val="0"/>
-                </a:spcAft>
-                <a:buClrTx/>
-                <a:buSzTx/>
-                <a:buFontTx/>
-                <a:buNone/>
-                <a:tabLst/>
-                <a:defRPr/>
-              </a:pPr>
               <a:endParaRPr kumimoji="1" lang="zh-CN" altLang="en-US" sz="3200" b="1" i="0" u="none" strike="noStrike" kern="1200" cap="none" spc="0" normalizeH="0" baseline="0" noProof="0" dirty="0">
                 <a:ln>
                   <a:noFill/>
@@ -49373,7 +49418,7 @@
         </p:sp>
         <p:cxnSp>
           <p:nvCxnSpPr>
-            <p:cNvPr id="44" name="直接连接符 5"/>
+            <p:cNvPr id="9" name="直接连接符 5"/>
             <p:cNvCxnSpPr/>
             <p:nvPr/>
           </p:nvCxnSpPr>
@@ -49411,16 +49456,14 @@
       </p:grpSp>
       <p:cxnSp>
         <p:nvCxnSpPr>
-          <p:cNvPr id="49" name="직선 연결선 48"/>
-          <p:cNvCxnSpPr>
-            <a:cxnSpLocks/>
-          </p:cNvCxnSpPr>
+          <p:cNvPr id="14" name="직선 연결선 13"/>
+          <p:cNvCxnSpPr/>
           <p:nvPr/>
         </p:nvCxnSpPr>
         <p:spPr>
           <a:xfrm>
             <a:off x="400140" y="1235678"/>
-            <a:ext cx="5180528" cy="0"/>
+            <a:ext cx="4059893" cy="26351"/>
           </a:xfrm>
           <a:prstGeom prst="line">
             <a:avLst/>
@@ -49441,40 +49484,10 @@
           </a:fontRef>
         </p:style>
       </p:cxnSp>
-      <p:pic>
-        <p:nvPicPr>
-          <p:cNvPr id="3" name="그림 2">
-            <a:extLst>
-              <a:ext uri="{FF2B5EF4-FFF2-40B4-BE49-F238E27FC236}">
-                <a16:creationId xmlns:a16="http://schemas.microsoft.com/office/drawing/2014/main" id="{DCECAC73-7304-4370-980D-3FF41E59DCE1}"/>
-              </a:ext>
-            </a:extLst>
-          </p:cNvPr>
-          <p:cNvPicPr>
-            <a:picLocks noChangeAspect="1"/>
-          </p:cNvPicPr>
-          <p:nvPr/>
-        </p:nvPicPr>
-        <p:blipFill>
-          <a:blip r:embed="rId2"/>
-          <a:stretch>
-            <a:fillRect/>
-          </a:stretch>
-        </p:blipFill>
-        <p:spPr>
-          <a:xfrm>
-            <a:off x="1815253" y="1479901"/>
-            <a:ext cx="8643876" cy="5099169"/>
-          </a:xfrm>
-          <a:prstGeom prst="rect">
-            <a:avLst/>
-          </a:prstGeom>
-        </p:spPr>
-      </p:pic>
     </p:spTree>
     <p:extLst>
       <p:ext uri="{BB962C8B-B14F-4D97-AF65-F5344CB8AC3E}">
-        <p14:creationId xmlns:p14="http://schemas.microsoft.com/office/powerpoint/2010/main" val="1311663866"/>
+        <p14:creationId xmlns:p14="http://schemas.microsoft.com/office/powerpoint/2010/main" val="3984871178"/>
       </p:ext>
     </p:extLst>
   </p:cSld>

</xml_diff>